<commit_message>
Update session 22 documents.
</commit_message>
<xml_diff>
--- a/CPSC-24700/Presentations/session-22.pptx
+++ b/CPSC-24700/Presentations/session-22.pptx
@@ -5,19 +5,20 @@
     <p:sldMasterId id="2147483648" r:id="rId1"/>
   </p:sldMasterIdLst>
   <p:notesMasterIdLst>
-    <p:notesMasterId r:id="rId12"/>
+    <p:notesMasterId r:id="rId13"/>
   </p:notesMasterIdLst>
   <p:sldIdLst>
     <p:sldId id="257" r:id="rId2"/>
     <p:sldId id="291" r:id="rId3"/>
-    <p:sldId id="300" r:id="rId4"/>
-    <p:sldId id="318" r:id="rId5"/>
-    <p:sldId id="312" r:id="rId6"/>
-    <p:sldId id="313" r:id="rId7"/>
-    <p:sldId id="314" r:id="rId8"/>
-    <p:sldId id="315" r:id="rId9"/>
-    <p:sldId id="316" r:id="rId10"/>
-    <p:sldId id="263" r:id="rId11"/>
+    <p:sldId id="319" r:id="rId4"/>
+    <p:sldId id="300" r:id="rId5"/>
+    <p:sldId id="318" r:id="rId6"/>
+    <p:sldId id="312" r:id="rId7"/>
+    <p:sldId id="313" r:id="rId8"/>
+    <p:sldId id="314" r:id="rId9"/>
+    <p:sldId id="315" r:id="rId10"/>
+    <p:sldId id="316" r:id="rId11"/>
+    <p:sldId id="263" r:id="rId12"/>
   </p:sldIdLst>
   <p:sldSz cx="12192000" cy="6858000"/>
   <p:notesSz cx="7315200" cy="9601200"/>
@@ -124,6 +125,10 @@
 </p:presentation>
 </file>
 
+<file path=ppt/revisionInfo.xml><?xml version="1.0" encoding="utf-8"?>
+<p1510:revInfo xmlns:a="http://schemas.openxmlformats.org/drawingml/2006/main" xmlns:r="http://schemas.openxmlformats.org/officeDocument/2006/relationships" xmlns:p1510="http://schemas.microsoft.com/office/powerpoint/2015/10/main"/>
+</file>
+
 <file path=ppt/notesMasters/notesMaster1.xml><?xml version="1.0" encoding="utf-8"?>
 <p:notesMaster xmlns:a="http://schemas.openxmlformats.org/drawingml/2006/main" xmlns:r="http://schemas.openxmlformats.org/officeDocument/2006/relationships" xmlns:p="http://schemas.openxmlformats.org/presentationml/2006/main">
   <p:cSld>
@@ -206,7 +211,7 @@
           <a:p>
             <a:fld id="{1CF91C02-A59E-4778-8D4F-4840DBBEFA68}" type="datetimeFigureOut">
               <a:rPr lang="en-US" smtClean="0"/>
-              <a:t>10/19/2017</a:t>
+              <a:t>10/20/2017</a:t>
             </a:fld>
             <a:endParaRPr lang="en-US"/>
           </a:p>
@@ -518,10 +523,9 @@
           <a:lstStyle/>
           <a:p>
             <a:r>
-              <a:rPr lang="en-US"/>
-              <a:t>Test sync.</a:t>
-            </a:r>
-            <a:endParaRPr lang="en-US" dirty="0"/>
+              <a:rPr lang="en-US" dirty="0"/>
+              <a:t>Start downloading the new version of the Google Maps Lite solution now.</a:t>
+            </a:r>
           </a:p>
         </p:txBody>
       </p:sp>
@@ -624,9 +628,93 @@
           <a:bodyPr/>
           <a:lstStyle/>
           <a:p>
+            <a:fld id="{23B99BB9-C7F6-43B3-A122-46088ABB36FB}" type="slidenum">
+              <a:rPr lang="en-US" smtClean="0"/>
+              <a:t>10</a:t>
+            </a:fld>
+            <a:endParaRPr lang="en-US"/>
+          </a:p>
+        </p:txBody>
+      </p:sp>
+    </p:spTree>
+    <p:extLst>
+      <p:ext uri="{BB962C8B-B14F-4D97-AF65-F5344CB8AC3E}">
+        <p14:creationId xmlns:p14="http://schemas.microsoft.com/office/powerpoint/2010/main" val="2300074426"/>
+      </p:ext>
+    </p:extLst>
+  </p:cSld>
+  <p:clrMapOvr>
+    <a:masterClrMapping/>
+  </p:clrMapOvr>
+</p:notes>
+</file>
+
+<file path=ppt/notesSlides/notesSlide11.xml><?xml version="1.0" encoding="utf-8"?>
+<p:notes xmlns:a="http://schemas.openxmlformats.org/drawingml/2006/main" xmlns:r="http://schemas.openxmlformats.org/officeDocument/2006/relationships" xmlns:p="http://schemas.openxmlformats.org/presentationml/2006/main">
+  <p:cSld>
+    <p:spTree>
+      <p:nvGrpSpPr>
+        <p:cNvPr id="1" name=""/>
+        <p:cNvGrpSpPr/>
+        <p:nvPr/>
+      </p:nvGrpSpPr>
+      <p:grpSpPr>
+        <a:xfrm>
+          <a:off x="0" y="0"/>
+          <a:ext cx="0" cy="0"/>
+          <a:chOff x="0" y="0"/>
+          <a:chExt cx="0" cy="0"/>
+        </a:xfrm>
+      </p:grpSpPr>
+      <p:sp>
+        <p:nvSpPr>
+          <p:cNvPr id="2" name="Slide Image Placeholder 1"/>
+          <p:cNvSpPr>
+            <a:spLocks noGrp="1" noRot="1" noChangeAspect="1"/>
+          </p:cNvSpPr>
+          <p:nvPr>
+            <p:ph type="sldImg"/>
+          </p:nvPr>
+        </p:nvSpPr>
+        <p:spPr/>
+      </p:sp>
+      <p:sp>
+        <p:nvSpPr>
+          <p:cNvPr id="3" name="Notes Placeholder 2"/>
+          <p:cNvSpPr>
+            <a:spLocks noGrp="1"/>
+          </p:cNvSpPr>
+          <p:nvPr>
+            <p:ph type="body" idx="1"/>
+          </p:nvPr>
+        </p:nvSpPr>
+        <p:spPr/>
+        <p:txBody>
+          <a:bodyPr/>
+          <a:lstStyle/>
+          <a:p>
+            <a:endParaRPr lang="en-US" dirty="0"/>
+          </a:p>
+        </p:txBody>
+      </p:sp>
+      <p:sp>
+        <p:nvSpPr>
+          <p:cNvPr id="4" name="Slide Number Placeholder 3"/>
+          <p:cNvSpPr>
+            <a:spLocks noGrp="1"/>
+          </p:cNvSpPr>
+          <p:nvPr>
+            <p:ph type="sldNum" sz="quarter" idx="10"/>
+          </p:nvPr>
+        </p:nvSpPr>
+        <p:spPr/>
+        <p:txBody>
+          <a:bodyPr/>
+          <a:lstStyle/>
+          <a:p>
             <a:fld id="{5394DE12-7B9B-46AA-AC19-C30A49928B9B}" type="slidenum">
               <a:rPr lang="en-US" smtClean="0"/>
-              <a:t>10</a:t>
+              <a:t>11</a:t>
             </a:fld>
             <a:endParaRPr lang="en-US" dirty="0"/>
           </a:p>
@@ -800,18 +888,18 @@
           <a:bodyPr/>
           <a:lstStyle/>
           <a:p>
-            <a:fld id="{5394DE12-7B9B-46AA-AC19-C30A49928B9B}" type="slidenum">
+            <a:fld id="{23B99BB9-C7F6-43B3-A122-46088ABB36FB}" type="slidenum">
               <a:rPr lang="en-US" smtClean="0"/>
               <a:t>3</a:t>
             </a:fld>
-            <a:endParaRPr lang="en-US" dirty="0"/>
+            <a:endParaRPr lang="en-US"/>
           </a:p>
         </p:txBody>
       </p:sp>
     </p:spTree>
     <p:extLst>
       <p:ext uri="{BB962C8B-B14F-4D97-AF65-F5344CB8AC3E}">
-        <p14:creationId xmlns:p14="http://schemas.microsoft.com/office/powerpoint/2010/main" val="1150630978"/>
+        <p14:creationId xmlns:p14="http://schemas.microsoft.com/office/powerpoint/2010/main" val="2287070415"/>
       </p:ext>
     </p:extLst>
   </p:cSld>
@@ -865,7 +953,7 @@
           <a:bodyPr/>
           <a:lstStyle/>
           <a:p>
-            <a:endParaRPr lang="en-US" dirty="0"/>
+            <a:endParaRPr lang="en-US" sz="1000" dirty="0"/>
           </a:p>
         </p:txBody>
       </p:sp>
@@ -884,18 +972,18 @@
           <a:bodyPr/>
           <a:lstStyle/>
           <a:p>
-            <a:fld id="{23B99BB9-C7F6-43B3-A122-46088ABB36FB}" type="slidenum">
+            <a:fld id="{5394DE12-7B9B-46AA-AC19-C30A49928B9B}" type="slidenum">
               <a:rPr lang="en-US" smtClean="0"/>
               <a:t>4</a:t>
             </a:fld>
-            <a:endParaRPr lang="en-US"/>
+            <a:endParaRPr lang="en-US" dirty="0"/>
           </a:p>
         </p:txBody>
       </p:sp>
     </p:spTree>
     <p:extLst>
       <p:ext uri="{BB962C8B-B14F-4D97-AF65-F5344CB8AC3E}">
-        <p14:creationId xmlns:p14="http://schemas.microsoft.com/office/powerpoint/2010/main" val="1826705078"/>
+        <p14:creationId xmlns:p14="http://schemas.microsoft.com/office/powerpoint/2010/main" val="1150630978"/>
       </p:ext>
     </p:extLst>
   </p:cSld>
@@ -949,10 +1037,7 @@
           <a:bodyPr/>
           <a:lstStyle/>
           <a:p>
-            <a:r>
-              <a:rPr lang="en-US" dirty="0"/>
-              <a:t>Creating ‘Hello World’ from ‘Yahtzee Dice Roller’ with external JavaScript and CSS files was the assignment for Monday last week. Let’s do it together to make sure that we are in the same place. </a:t>
-            </a:r>
+            <a:endParaRPr lang="en-US" dirty="0"/>
           </a:p>
         </p:txBody>
       </p:sp>
@@ -982,7 +1067,7 @@
     </p:spTree>
     <p:extLst>
       <p:ext uri="{BB962C8B-B14F-4D97-AF65-F5344CB8AC3E}">
-        <p14:creationId xmlns:p14="http://schemas.microsoft.com/office/powerpoint/2010/main" val="1223204962"/>
+        <p14:creationId xmlns:p14="http://schemas.microsoft.com/office/powerpoint/2010/main" val="1826705078"/>
       </p:ext>
     </p:extLst>
   </p:cSld>
@@ -1036,7 +1121,10 @@
           <a:bodyPr/>
           <a:lstStyle/>
           <a:p>
-            <a:endParaRPr lang="en-US" dirty="0"/>
+            <a:r>
+              <a:rPr lang="en-US" dirty="0"/>
+              <a:t>Creating ‘Hello World’ from ‘Yahtzee Dice Roller’ with external JavaScript and CSS files was the assignment for Monday last week. Let’s do it together to make sure that we are in the same place. </a:t>
+            </a:r>
           </a:p>
         </p:txBody>
       </p:sp>
@@ -1066,7 +1154,7 @@
     </p:spTree>
     <p:extLst>
       <p:ext uri="{BB962C8B-B14F-4D97-AF65-F5344CB8AC3E}">
-        <p14:creationId xmlns:p14="http://schemas.microsoft.com/office/powerpoint/2010/main" val="1625802623"/>
+        <p14:creationId xmlns:p14="http://schemas.microsoft.com/office/powerpoint/2010/main" val="1223204962"/>
       </p:ext>
     </p:extLst>
   </p:cSld>
@@ -1150,7 +1238,7 @@
     </p:spTree>
     <p:extLst>
       <p:ext uri="{BB962C8B-B14F-4D97-AF65-F5344CB8AC3E}">
-        <p14:creationId xmlns:p14="http://schemas.microsoft.com/office/powerpoint/2010/main" val="2828765227"/>
+        <p14:creationId xmlns:p14="http://schemas.microsoft.com/office/powerpoint/2010/main" val="1625802623"/>
       </p:ext>
     </p:extLst>
   </p:cSld>
@@ -1234,7 +1322,7 @@
     </p:spTree>
     <p:extLst>
       <p:ext uri="{BB962C8B-B14F-4D97-AF65-F5344CB8AC3E}">
-        <p14:creationId xmlns:p14="http://schemas.microsoft.com/office/powerpoint/2010/main" val="3321655879"/>
+        <p14:creationId xmlns:p14="http://schemas.microsoft.com/office/powerpoint/2010/main" val="2828765227"/>
       </p:ext>
     </p:extLst>
   </p:cSld>
@@ -1318,7 +1406,7 @@
     </p:spTree>
     <p:extLst>
       <p:ext uri="{BB962C8B-B14F-4D97-AF65-F5344CB8AC3E}">
-        <p14:creationId xmlns:p14="http://schemas.microsoft.com/office/powerpoint/2010/main" val="2300074426"/>
+        <p14:creationId xmlns:p14="http://schemas.microsoft.com/office/powerpoint/2010/main" val="3321655879"/>
       </p:ext>
     </p:extLst>
   </p:cSld>
@@ -1475,7 +1563,7 @@
           <a:p>
             <a:fld id="{5FB62F81-FD80-4AA8-93CA-E835B40BE667}" type="datetimeFigureOut">
               <a:rPr lang="en-US" smtClean="0"/>
-              <a:t>10/19/2017</a:t>
+              <a:t>10/20/2017</a:t>
             </a:fld>
             <a:endParaRPr lang="en-US"/>
           </a:p>
@@ -1673,7 +1761,7 @@
           <a:p>
             <a:fld id="{5FB62F81-FD80-4AA8-93CA-E835B40BE667}" type="datetimeFigureOut">
               <a:rPr lang="en-US" smtClean="0"/>
-              <a:t>10/19/2017</a:t>
+              <a:t>10/20/2017</a:t>
             </a:fld>
             <a:endParaRPr lang="en-US"/>
           </a:p>
@@ -1881,7 +1969,7 @@
           <a:p>
             <a:fld id="{5FB62F81-FD80-4AA8-93CA-E835B40BE667}" type="datetimeFigureOut">
               <a:rPr lang="en-US" smtClean="0"/>
-              <a:t>10/19/2017</a:t>
+              <a:t>10/20/2017</a:t>
             </a:fld>
             <a:endParaRPr lang="en-US"/>
           </a:p>
@@ -2079,7 +2167,7 @@
           <a:p>
             <a:fld id="{5FB62F81-FD80-4AA8-93CA-E835B40BE667}" type="datetimeFigureOut">
               <a:rPr lang="en-US" smtClean="0"/>
-              <a:t>10/19/2017</a:t>
+              <a:t>10/20/2017</a:t>
             </a:fld>
             <a:endParaRPr lang="en-US"/>
           </a:p>
@@ -2354,7 +2442,7 @@
           <a:p>
             <a:fld id="{5FB62F81-FD80-4AA8-93CA-E835B40BE667}" type="datetimeFigureOut">
               <a:rPr lang="en-US" smtClean="0"/>
-              <a:t>10/19/2017</a:t>
+              <a:t>10/20/2017</a:t>
             </a:fld>
             <a:endParaRPr lang="en-US"/>
           </a:p>
@@ -2619,7 +2707,7 @@
           <a:p>
             <a:fld id="{5FB62F81-FD80-4AA8-93CA-E835B40BE667}" type="datetimeFigureOut">
               <a:rPr lang="en-US" smtClean="0"/>
-              <a:t>10/19/2017</a:t>
+              <a:t>10/20/2017</a:t>
             </a:fld>
             <a:endParaRPr lang="en-US"/>
           </a:p>
@@ -3031,7 +3119,7 @@
           <a:p>
             <a:fld id="{5FB62F81-FD80-4AA8-93CA-E835B40BE667}" type="datetimeFigureOut">
               <a:rPr lang="en-US" smtClean="0"/>
-              <a:t>10/19/2017</a:t>
+              <a:t>10/20/2017</a:t>
             </a:fld>
             <a:endParaRPr lang="en-US"/>
           </a:p>
@@ -3172,7 +3260,7 @@
           <a:p>
             <a:fld id="{5FB62F81-FD80-4AA8-93CA-E835B40BE667}" type="datetimeFigureOut">
               <a:rPr lang="en-US" smtClean="0"/>
-              <a:t>10/19/2017</a:t>
+              <a:t>10/20/2017</a:t>
             </a:fld>
             <a:endParaRPr lang="en-US"/>
           </a:p>
@@ -3285,7 +3373,7 @@
           <a:p>
             <a:fld id="{5FB62F81-FD80-4AA8-93CA-E835B40BE667}" type="datetimeFigureOut">
               <a:rPr lang="en-US" smtClean="0"/>
-              <a:t>10/19/2017</a:t>
+              <a:t>10/20/2017</a:t>
             </a:fld>
             <a:endParaRPr lang="en-US"/>
           </a:p>
@@ -3596,7 +3684,7 @@
           <a:p>
             <a:fld id="{5FB62F81-FD80-4AA8-93CA-E835B40BE667}" type="datetimeFigureOut">
               <a:rPr lang="en-US" smtClean="0"/>
-              <a:t>10/19/2017</a:t>
+              <a:t>10/20/2017</a:t>
             </a:fld>
             <a:endParaRPr lang="en-US"/>
           </a:p>
@@ -3884,7 +3972,7 @@
           <a:p>
             <a:fld id="{5FB62F81-FD80-4AA8-93CA-E835B40BE667}" type="datetimeFigureOut">
               <a:rPr lang="en-US" smtClean="0"/>
-              <a:t>10/19/2017</a:t>
+              <a:t>10/20/2017</a:t>
             </a:fld>
             <a:endParaRPr lang="en-US"/>
           </a:p>
@@ -4125,7 +4213,7 @@
           <a:p>
             <a:fld id="{5FB62F81-FD80-4AA8-93CA-E835B40BE667}" type="datetimeFigureOut">
               <a:rPr lang="en-US" smtClean="0"/>
-              <a:t>10/19/2017</a:t>
+              <a:t>10/20/2017</a:t>
             </a:fld>
             <a:endParaRPr lang="en-US"/>
           </a:p>
@@ -4649,7 +4737,7 @@
             </a:pPr>
             <a:r>
               <a:rPr lang="en-US" sz="2000" dirty="0"/>
-              <a:t>Midterm Exam 1 Discussion</a:t>
+              <a:t>New Assignments for Monday</a:t>
             </a:r>
           </a:p>
           <a:p>
@@ -4749,6 +4837,328 @@
 <file path=ppt/slides/slide10.xml><?xml version="1.0" encoding="utf-8"?>
 <p:sld xmlns:a="http://schemas.openxmlformats.org/drawingml/2006/main" xmlns:r="http://schemas.openxmlformats.org/officeDocument/2006/relationships" xmlns:p="http://schemas.openxmlformats.org/presentationml/2006/main">
   <p:cSld>
+    <p:spTree>
+      <p:nvGrpSpPr>
+        <p:cNvPr id="1" name=""/>
+        <p:cNvGrpSpPr/>
+        <p:nvPr/>
+      </p:nvGrpSpPr>
+      <p:grpSpPr>
+        <a:xfrm>
+          <a:off x="0" y="0"/>
+          <a:ext cx="0" cy="0"/>
+          <a:chOff x="0" y="0"/>
+          <a:chExt cx="0" cy="0"/>
+        </a:xfrm>
+      </p:grpSpPr>
+      <p:sp>
+        <p:nvSpPr>
+          <p:cNvPr id="4" name="Title 1">
+            <a:extLst>
+              <a:ext uri="{FF2B5EF4-FFF2-40B4-BE49-F238E27FC236}">
+                <a16:creationId xmlns:a16="http://schemas.microsoft.com/office/drawing/2014/main" id="{527CE47F-3EF6-48CA-9239-E8B6E5C6B41A}"/>
+              </a:ext>
+            </a:extLst>
+          </p:cNvPr>
+          <p:cNvSpPr>
+            <a:spLocks noGrp="1"/>
+          </p:cNvSpPr>
+          <p:nvPr>
+            <p:ph type="title"/>
+          </p:nvPr>
+        </p:nvSpPr>
+        <p:spPr>
+          <a:xfrm>
+            <a:off x="838200" y="365125"/>
+            <a:ext cx="10515600" cy="1325563"/>
+          </a:xfrm>
+        </p:spPr>
+        <p:txBody>
+          <a:bodyPr>
+            <a:normAutofit/>
+          </a:bodyPr>
+          <a:lstStyle/>
+          <a:p>
+            <a:r>
+              <a:rPr lang="en-US" sz="3600" dirty="0"/>
+              <a:t>Remove or Repurpose Yahtzee Code</a:t>
+            </a:r>
+          </a:p>
+        </p:txBody>
+      </p:sp>
+      <p:sp>
+        <p:nvSpPr>
+          <p:cNvPr id="5" name="Content Placeholder 2">
+            <a:extLst>
+              <a:ext uri="{FF2B5EF4-FFF2-40B4-BE49-F238E27FC236}">
+                <a16:creationId xmlns:a16="http://schemas.microsoft.com/office/drawing/2014/main" id="{E8F0EA9A-219C-40FD-AE36-784EE1B77D56}"/>
+              </a:ext>
+            </a:extLst>
+          </p:cNvPr>
+          <p:cNvSpPr>
+            <a:spLocks noGrp="1"/>
+          </p:cNvSpPr>
+          <p:nvPr>
+            <p:ph idx="1"/>
+          </p:nvPr>
+        </p:nvSpPr>
+        <p:spPr>
+          <a:xfrm>
+            <a:off x="838198" y="1525772"/>
+            <a:ext cx="10515601" cy="4651191"/>
+          </a:xfrm>
+        </p:spPr>
+        <p:txBody>
+          <a:bodyPr>
+            <a:normAutofit/>
+          </a:bodyPr>
+          <a:lstStyle/>
+          <a:p>
+            <a:pPr marL="0" indent="0">
+              <a:buNone/>
+            </a:pPr>
+            <a:r>
+              <a:rPr lang="en-US" sz="2000" dirty="0"/>
+              <a:t>Step 4 – Create step 4 files and know what you will need to do to submit project: </a:t>
+            </a:r>
+          </a:p>
+          <a:p>
+            <a:pPr marL="457200" indent="-457200">
+              <a:buFont typeface="+mj-lt"/>
+              <a:buAutoNum type="arabicPeriod"/>
+            </a:pPr>
+            <a:r>
+              <a:rPr lang="en-US" sz="2000" dirty="0"/>
+              <a:t>Copy all three ‘step-03’ files to ‘step-04’ html, </a:t>
+            </a:r>
+            <a:r>
+              <a:rPr lang="en-US" sz="2000" dirty="0" err="1"/>
+              <a:t>css</a:t>
+            </a:r>
+            <a:r>
+              <a:rPr lang="en-US" sz="2000" dirty="0"/>
+              <a:t>, and </a:t>
+            </a:r>
+            <a:r>
+              <a:rPr lang="en-US" sz="2000" dirty="0" err="1"/>
+              <a:t>js</a:t>
+            </a:r>
+            <a:r>
+              <a:rPr lang="en-US" sz="2000" dirty="0"/>
+              <a:t> files</a:t>
+            </a:r>
+          </a:p>
+          <a:p>
+            <a:pPr marL="457200" indent="-457200">
+              <a:buFont typeface="+mj-lt"/>
+              <a:buAutoNum type="arabicPeriod"/>
+            </a:pPr>
+            <a:r>
+              <a:rPr lang="en-US" sz="2000" dirty="0"/>
+              <a:t>Move all style related items to external </a:t>
+            </a:r>
+            <a:r>
+              <a:rPr lang="en-US" sz="2000" dirty="0" err="1"/>
+              <a:t>css</a:t>
+            </a:r>
+            <a:r>
+              <a:rPr lang="en-US" sz="2000" dirty="0"/>
+              <a:t> file</a:t>
+            </a:r>
+          </a:p>
+          <a:p>
+            <a:pPr marL="457200" indent="-457200">
+              <a:buFont typeface="+mj-lt"/>
+              <a:buAutoNum type="arabicPeriod"/>
+            </a:pPr>
+            <a:r>
+              <a:rPr lang="en-US" sz="2000" dirty="0"/>
+              <a:t>Remove/repurpose Yahtzee code to create Instructions and Hints… does it work? </a:t>
+            </a:r>
+          </a:p>
+          <a:p>
+            <a:pPr marL="457200" indent="-457200">
+              <a:buFont typeface="+mj-lt"/>
+              <a:buAutoNum type="arabicPeriod"/>
+            </a:pPr>
+            <a:r>
+              <a:rPr lang="en-US" sz="2000" dirty="0"/>
+              <a:t>If you want, you can utilize ‘step-04’ to continue enhancing your solution </a:t>
+            </a:r>
+            <a:r>
+              <a:rPr lang="en-US" sz="2000"/>
+              <a:t>(“step-05”?)</a:t>
+            </a:r>
+            <a:endParaRPr lang="en-US" sz="2000" dirty="0"/>
+          </a:p>
+          <a:p>
+            <a:pPr marL="457200" indent="-457200">
+              <a:buFont typeface="+mj-lt"/>
+              <a:buAutoNum type="arabicPeriod"/>
+            </a:pPr>
+            <a:r>
+              <a:rPr lang="en-US" sz="2000" dirty="0"/>
+              <a:t>Do you know what it would take to finalize and submit ‘step-04’? </a:t>
+            </a:r>
+          </a:p>
+          <a:p>
+            <a:pPr marL="0" indent="0">
+              <a:buNone/>
+            </a:pPr>
+            <a:endParaRPr lang="en-US" sz="2000" dirty="0"/>
+          </a:p>
+          <a:p>
+            <a:pPr marL="457200" indent="-457200">
+              <a:buFont typeface="+mj-lt"/>
+              <a:buAutoNum type="arabicPeriod"/>
+            </a:pPr>
+            <a:endParaRPr lang="en-US" sz="2000" dirty="0"/>
+          </a:p>
+          <a:p>
+            <a:endParaRPr lang="en-US" sz="2000" dirty="0"/>
+          </a:p>
+          <a:p>
+            <a:pPr marL="0" indent="0">
+              <a:buNone/>
+            </a:pPr>
+            <a:endParaRPr lang="en-US" sz="2000" dirty="0"/>
+          </a:p>
+          <a:p>
+            <a:pPr marL="0" indent="0">
+              <a:buNone/>
+            </a:pPr>
+            <a:endParaRPr lang="en-US" sz="2000" dirty="0"/>
+          </a:p>
+          <a:p>
+            <a:pPr marL="0" indent="0">
+              <a:buNone/>
+            </a:pPr>
+            <a:endParaRPr lang="en-US" sz="2000" dirty="0"/>
+          </a:p>
+          <a:p>
+            <a:pPr marL="0" indent="0">
+              <a:buNone/>
+            </a:pPr>
+            <a:endParaRPr lang="en-US" sz="2000" dirty="0"/>
+          </a:p>
+          <a:p>
+            <a:pPr marL="0" indent="0">
+              <a:buNone/>
+            </a:pPr>
+            <a:endParaRPr lang="en-US" sz="2000" dirty="0"/>
+          </a:p>
+        </p:txBody>
+      </p:sp>
+      <p:pic>
+        <p:nvPicPr>
+          <p:cNvPr id="2050" name="Picture 1" descr="Incorrect">
+            <a:extLst>
+              <a:ext uri="{FF2B5EF4-FFF2-40B4-BE49-F238E27FC236}">
+                <a16:creationId xmlns:a16="http://schemas.microsoft.com/office/drawing/2014/main" id="{FF58184F-9DBB-46F2-9AD1-5DD64E112630}"/>
+              </a:ext>
+            </a:extLst>
+          </p:cNvPr>
+          <p:cNvPicPr>
+            <a:picLocks noChangeAspect="1" noChangeArrowheads="1"/>
+          </p:cNvPicPr>
+          <p:nvPr/>
+        </p:nvPicPr>
+        <p:blipFill>
+          <a:blip r:embed="rId3">
+            <a:extLst>
+              <a:ext uri="{28A0092B-C50C-407E-A947-70E740481C1C}">
+                <a14:useLocalDpi xmlns:a14="http://schemas.microsoft.com/office/drawing/2010/main" val="0"/>
+              </a:ext>
+            </a:extLst>
+          </a:blip>
+          <a:srcRect/>
+          <a:stretch>
+            <a:fillRect/>
+          </a:stretch>
+        </p:blipFill>
+        <p:spPr bwMode="auto">
+          <a:xfrm>
+            <a:off x="0" y="0"/>
+            <a:ext cx="133350" cy="133350"/>
+          </a:xfrm>
+          <a:prstGeom prst="rect">
+            <a:avLst/>
+          </a:prstGeom>
+          <a:noFill/>
+          <a:extLst>
+            <a:ext uri="{909E8E84-426E-40DD-AFC4-6F175D3DCCD1}">
+              <a14:hiddenFill xmlns:a14="http://schemas.microsoft.com/office/drawing/2010/main">
+                <a:solidFill>
+                  <a:srgbClr val="FFFFFF"/>
+                </a:solidFill>
+              </a14:hiddenFill>
+            </a:ext>
+          </a:extLst>
+        </p:spPr>
+      </p:pic>
+      <p:pic>
+        <p:nvPicPr>
+          <p:cNvPr id="2051" name="Picture 2" descr="check">
+            <a:extLst>
+              <a:ext uri="{FF2B5EF4-FFF2-40B4-BE49-F238E27FC236}">
+                <a16:creationId xmlns:a16="http://schemas.microsoft.com/office/drawing/2014/main" id="{78300109-7A83-4484-8401-B9245A233358}"/>
+              </a:ext>
+            </a:extLst>
+          </p:cNvPr>
+          <p:cNvPicPr>
+            <a:picLocks noChangeAspect="1" noChangeArrowheads="1"/>
+          </p:cNvPicPr>
+          <p:nvPr/>
+        </p:nvPicPr>
+        <p:blipFill>
+          <a:blip r:embed="rId4">
+            <a:extLst>
+              <a:ext uri="{28A0092B-C50C-407E-A947-70E740481C1C}">
+                <a14:useLocalDpi xmlns:a14="http://schemas.microsoft.com/office/drawing/2010/main" val="0"/>
+              </a:ext>
+            </a:extLst>
+          </a:blip>
+          <a:srcRect/>
+          <a:stretch>
+            <a:fillRect/>
+          </a:stretch>
+        </p:blipFill>
+        <p:spPr bwMode="auto">
+          <a:xfrm>
+            <a:off x="0" y="0"/>
+            <a:ext cx="133350" cy="133350"/>
+          </a:xfrm>
+          <a:prstGeom prst="rect">
+            <a:avLst/>
+          </a:prstGeom>
+          <a:noFill/>
+          <a:extLst>
+            <a:ext uri="{909E8E84-426E-40DD-AFC4-6F175D3DCCD1}">
+              <a14:hiddenFill xmlns:a14="http://schemas.microsoft.com/office/drawing/2010/main">
+                <a:solidFill>
+                  <a:srgbClr val="FFFFFF"/>
+                </a:solidFill>
+              </a14:hiddenFill>
+            </a:ext>
+          </a:extLst>
+        </p:spPr>
+      </p:pic>
+    </p:spTree>
+    <p:extLst>
+      <p:ext uri="{BB962C8B-B14F-4D97-AF65-F5344CB8AC3E}">
+        <p14:creationId xmlns:p14="http://schemas.microsoft.com/office/powerpoint/2010/main" val="4292049979"/>
+      </p:ext>
+    </p:extLst>
+  </p:cSld>
+  <p:clrMapOvr>
+    <a:masterClrMapping/>
+  </p:clrMapOvr>
+</p:sld>
+</file>
+
+<file path=ppt/slides/slide11.xml><?xml version="1.0" encoding="utf-8"?>
+<p:sld xmlns:a="http://schemas.openxmlformats.org/drawingml/2006/main" xmlns:r="http://schemas.openxmlformats.org/officeDocument/2006/relationships" xmlns:p="http://schemas.openxmlformats.org/presentationml/2006/main">
+  <p:cSld>
     <p:bg>
       <p:bgPr>
         <a:solidFill>
@@ -5007,6 +5417,137 @@
       </p:grpSpPr>
       <p:sp>
         <p:nvSpPr>
+          <p:cNvPr id="4" name="Title 1">
+            <a:extLst>
+              <a:ext uri="{FF2B5EF4-FFF2-40B4-BE49-F238E27FC236}">
+                <a16:creationId xmlns:a16="http://schemas.microsoft.com/office/drawing/2014/main" id="{527CE47F-3EF6-48CA-9239-E8B6E5C6B41A}"/>
+              </a:ext>
+            </a:extLst>
+          </p:cNvPr>
+          <p:cNvSpPr>
+            <a:spLocks noGrp="1"/>
+          </p:cNvSpPr>
+          <p:nvPr>
+            <p:ph type="title"/>
+          </p:nvPr>
+        </p:nvSpPr>
+        <p:spPr>
+          <a:xfrm>
+            <a:off x="838200" y="365125"/>
+            <a:ext cx="10515600" cy="1325563"/>
+          </a:xfrm>
+        </p:spPr>
+        <p:txBody>
+          <a:bodyPr>
+            <a:normAutofit/>
+          </a:bodyPr>
+          <a:lstStyle/>
+          <a:p>
+            <a:r>
+              <a:rPr lang="en-US" sz="3600" dirty="0"/>
+              <a:t>Todays Assignment for Monday</a:t>
+            </a:r>
+          </a:p>
+        </p:txBody>
+      </p:sp>
+      <p:sp>
+        <p:nvSpPr>
+          <p:cNvPr id="5" name="Content Placeholder 2">
+            <a:extLst>
+              <a:ext uri="{FF2B5EF4-FFF2-40B4-BE49-F238E27FC236}">
+                <a16:creationId xmlns:a16="http://schemas.microsoft.com/office/drawing/2014/main" id="{E8F0EA9A-219C-40FD-AE36-784EE1B77D56}"/>
+              </a:ext>
+            </a:extLst>
+          </p:cNvPr>
+          <p:cNvSpPr>
+            <a:spLocks noGrp="1"/>
+          </p:cNvSpPr>
+          <p:nvPr>
+            <p:ph idx="1"/>
+          </p:nvPr>
+        </p:nvSpPr>
+        <p:spPr>
+          <a:xfrm>
+            <a:off x="838198" y="1525772"/>
+            <a:ext cx="10515601" cy="4651191"/>
+          </a:xfrm>
+        </p:spPr>
+        <p:txBody>
+          <a:bodyPr>
+            <a:normAutofit/>
+          </a:bodyPr>
+          <a:lstStyle/>
+          <a:p>
+            <a:pPr marL="0" indent="0">
+              <a:spcBef>
+                <a:spcPts val="4800"/>
+              </a:spcBef>
+              <a:buNone/>
+            </a:pPr>
+            <a:r>
+              <a:rPr lang="en-US" sz="2000" u="sng" dirty="0"/>
+              <a:t>Assignment (before next class):</a:t>
+            </a:r>
+            <a:endParaRPr lang="en-US" sz="2000" dirty="0"/>
+          </a:p>
+          <a:p>
+            <a:r>
+              <a:rPr lang="en-US" sz="2000" dirty="0"/>
+              <a:t>Work on Project 3 due Wednesday</a:t>
+            </a:r>
+          </a:p>
+          <a:p>
+            <a:r>
+              <a:rPr lang="en-US" sz="2000" dirty="0"/>
+              <a:t>Complete Ch.7.5 through 7.7</a:t>
+            </a:r>
+          </a:p>
+          <a:p>
+            <a:r>
+              <a:rPr lang="en-US" sz="2000" dirty="0"/>
+              <a:t>Review XML and Web Services slide 1-18</a:t>
+            </a:r>
+          </a:p>
+          <a:p>
+            <a:r>
+              <a:rPr lang="en-US" sz="2000" dirty="0"/>
+              <a:t>Read “What is JSON? JavaScript Object Notation Explained” article </a:t>
+            </a:r>
+          </a:p>
+        </p:txBody>
+      </p:sp>
+    </p:spTree>
+    <p:extLst>
+      <p:ext uri="{BB962C8B-B14F-4D97-AF65-F5344CB8AC3E}">
+        <p14:creationId xmlns:p14="http://schemas.microsoft.com/office/powerpoint/2010/main" val="3819419734"/>
+      </p:ext>
+    </p:extLst>
+  </p:cSld>
+  <p:clrMapOvr>
+    <a:masterClrMapping/>
+  </p:clrMapOvr>
+</p:sld>
+</file>
+
+<file path=ppt/slides/slide4.xml><?xml version="1.0" encoding="utf-8"?>
+<p:sld xmlns:a="http://schemas.openxmlformats.org/drawingml/2006/main" xmlns:r="http://schemas.openxmlformats.org/officeDocument/2006/relationships" xmlns:p="http://schemas.openxmlformats.org/presentationml/2006/main">
+  <p:cSld>
+    <p:spTree>
+      <p:nvGrpSpPr>
+        <p:cNvPr id="1" name=""/>
+        <p:cNvGrpSpPr/>
+        <p:nvPr/>
+      </p:nvGrpSpPr>
+      <p:grpSpPr>
+        <a:xfrm>
+          <a:off x="0" y="0"/>
+          <a:ext cx="0" cy="0"/>
+          <a:chOff x="0" y="0"/>
+          <a:chExt cx="0" cy="0"/>
+        </a:xfrm>
+      </p:grpSpPr>
+      <p:sp>
+        <p:nvSpPr>
           <p:cNvPr id="2" name="Title 1"/>
           <p:cNvSpPr>
             <a:spLocks noGrp="1"/>
@@ -5054,7 +5595,7 @@
 </p:sld>
 </file>
 
-<file path=ppt/slides/slide4.xml><?xml version="1.0" encoding="utf-8"?>
+<file path=ppt/slides/slide5.xml><?xml version="1.0" encoding="utf-8"?>
 <p:sld xmlns:a="http://schemas.openxmlformats.org/drawingml/2006/main" xmlns:r="http://schemas.openxmlformats.org/officeDocument/2006/relationships" xmlns:p="http://schemas.openxmlformats.org/presentationml/2006/main">
   <p:cSld>
     <p:spTree>
@@ -5377,7 +5918,7 @@
 </p:sld>
 </file>
 
-<file path=ppt/slides/slide5.xml><?xml version="1.0" encoding="utf-8"?>
+<file path=ppt/slides/slide6.xml><?xml version="1.0" encoding="utf-8"?>
 <p:sld xmlns:a="http://schemas.openxmlformats.org/drawingml/2006/main" xmlns:r="http://schemas.openxmlformats.org/officeDocument/2006/relationships" xmlns:p="http://schemas.openxmlformats.org/presentationml/2006/main">
   <p:cSld>
     <p:spTree>
@@ -5423,7 +5964,13 @@
           <a:lstStyle/>
           <a:p>
             <a:r>
-              <a:rPr lang="en-US" sz="3600" dirty="0"/>
+              <a:rPr lang="en-US" sz="3600" dirty="0">
+                <a:solidFill>
+                  <a:schemeClr val="bg1">
+                    <a:lumMod val="65000"/>
+                  </a:schemeClr>
+                </a:solidFill>
+              </a:rPr>
               <a:t>Start With Working, Tested, and Validated Hello World</a:t>
             </a:r>
           </a:p>
@@ -5461,7 +6008,13 @@
               <a:buNone/>
             </a:pPr>
             <a:r>
-              <a:rPr lang="en-US" sz="2000" dirty="0"/>
+              <a:rPr lang="en-US" sz="2000" dirty="0">
+                <a:solidFill>
+                  <a:schemeClr val="bg1">
+                    <a:lumMod val="65000"/>
+                  </a:schemeClr>
+                </a:solidFill>
+              </a:rPr>
               <a:t>Yahtzee Dice Roller to Hello World… Let’s do this TOGETHER: </a:t>
             </a:r>
           </a:p>
@@ -5471,7 +6024,13 @@
               <a:buAutoNum type="arabicPeriod"/>
             </a:pPr>
             <a:r>
-              <a:rPr lang="en-US" sz="2000" dirty="0"/>
+              <a:rPr lang="en-US" sz="2000" dirty="0">
+                <a:solidFill>
+                  <a:schemeClr val="bg1">
+                    <a:lumMod val="65000"/>
+                  </a:schemeClr>
+                </a:solidFill>
+              </a:rPr>
               <a:t>Copy ‘yahtzee-dice-roller-extern-js.html’ and ‘yahtzee-dice-roller-extern-js.js’ to working folder</a:t>
             </a:r>
           </a:p>
@@ -5481,7 +6040,13 @@
               <a:buAutoNum type="arabicPeriod"/>
             </a:pPr>
             <a:r>
-              <a:rPr lang="en-US" sz="2000" dirty="0"/>
+              <a:rPr lang="en-US" sz="2000" dirty="0">
+                <a:solidFill>
+                  <a:schemeClr val="bg1">
+                    <a:lumMod val="65000"/>
+                  </a:schemeClr>
+                </a:solidFill>
+              </a:rPr>
               <a:t>Rename them to ‘hello-world.html’ and ‘hello-world.js’</a:t>
             </a:r>
           </a:p>
@@ -5491,7 +6056,13 @@
               <a:buAutoNum type="arabicPeriod"/>
             </a:pPr>
             <a:r>
-              <a:rPr lang="en-US" sz="2000" dirty="0"/>
+              <a:rPr lang="en-US" sz="2000" dirty="0">
+                <a:solidFill>
+                  <a:schemeClr val="bg1">
+                    <a:lumMod val="65000"/>
+                  </a:schemeClr>
+                </a:solidFill>
+              </a:rPr>
               <a:t>Update the JavaScript link in ‘hello-world.html’</a:t>
             </a:r>
           </a:p>
@@ -5501,7 +6072,13 @@
               <a:buAutoNum type="arabicPeriod"/>
             </a:pPr>
             <a:r>
-              <a:rPr lang="en-US" sz="2000" dirty="0"/>
+              <a:rPr lang="en-US" sz="2000" dirty="0">
+                <a:solidFill>
+                  <a:schemeClr val="bg1">
+                    <a:lumMod val="65000"/>
+                  </a:schemeClr>
+                </a:solidFill>
+              </a:rPr>
               <a:t>Test hello-world application… does it work?</a:t>
             </a:r>
           </a:p>
@@ -5511,7 +6088,13 @@
               <a:buAutoNum type="arabicPeriod"/>
             </a:pPr>
             <a:r>
-              <a:rPr lang="en-US" sz="2000" dirty="0"/>
+              <a:rPr lang="en-US" sz="2000" dirty="0">
+                <a:solidFill>
+                  <a:schemeClr val="bg1">
+                    <a:lumMod val="65000"/>
+                  </a:schemeClr>
+                </a:solidFill>
+              </a:rPr>
               <a:t>Cut CSS code out of ‘hello-world.html’… see the change in behavior?</a:t>
             </a:r>
           </a:p>
@@ -5521,7 +6104,13 @@
               <a:buAutoNum type="arabicPeriod"/>
             </a:pPr>
             <a:r>
-              <a:rPr lang="en-US" sz="2000" dirty="0"/>
+              <a:rPr lang="en-US" sz="2000" dirty="0">
+                <a:solidFill>
+                  <a:schemeClr val="bg1">
+                    <a:lumMod val="65000"/>
+                  </a:schemeClr>
+                </a:solidFill>
+              </a:rPr>
               <a:t>Create a new file ‘hello-world.css’, move CSS code to external file, past CSS code into external file, and add link to ‘hello-world.html’… does it work?</a:t>
             </a:r>
           </a:p>
@@ -5531,7 +6120,13 @@
               <a:buAutoNum type="arabicPeriod"/>
             </a:pPr>
             <a:r>
-              <a:rPr lang="en-US" sz="2000" dirty="0"/>
+              <a:rPr lang="en-US" sz="2000" dirty="0">
+                <a:solidFill>
+                  <a:schemeClr val="bg1">
+                    <a:lumMod val="65000"/>
+                  </a:schemeClr>
+                </a:solidFill>
+              </a:rPr>
               <a:t>Add ‘console.log()’ message to ‘function random()’… test it with Developer Tools! Does it work? </a:t>
             </a:r>
           </a:p>
@@ -5541,49 +6136,27 @@
               <a:buAutoNum type="arabicPeriod"/>
             </a:pPr>
             <a:r>
-              <a:rPr lang="en-US" sz="2000" dirty="0"/>
+              <a:rPr lang="en-US" sz="2000" dirty="0">
+                <a:solidFill>
+                  <a:schemeClr val="bg1">
+                    <a:lumMod val="65000"/>
+                  </a:schemeClr>
+                </a:solidFill>
+              </a:rPr>
               <a:t>Success!</a:t>
             </a:r>
           </a:p>
           <a:p>
-            <a:pPr marL="457200" indent="-457200">
-              <a:buFont typeface="+mj-lt"/>
-              <a:buAutoNum type="arabicPeriod"/>
-            </a:pPr>
-            <a:endParaRPr lang="en-US" sz="2000" dirty="0"/>
-          </a:p>
-          <a:p>
-            <a:endParaRPr lang="en-US" sz="2000" dirty="0"/>
-          </a:p>
-          <a:p>
             <a:pPr marL="0" indent="0">
               <a:buNone/>
             </a:pPr>
-            <a:endParaRPr lang="en-US" sz="2000" dirty="0"/>
-          </a:p>
-          <a:p>
-            <a:pPr marL="0" indent="0">
-              <a:buNone/>
-            </a:pPr>
-            <a:endParaRPr lang="en-US" sz="2000" dirty="0"/>
-          </a:p>
-          <a:p>
-            <a:pPr marL="0" indent="0">
-              <a:buNone/>
-            </a:pPr>
-            <a:endParaRPr lang="en-US" sz="2000" dirty="0"/>
-          </a:p>
-          <a:p>
-            <a:pPr marL="0" indent="0">
-              <a:buNone/>
-            </a:pPr>
-            <a:endParaRPr lang="en-US" sz="2000" dirty="0"/>
-          </a:p>
-          <a:p>
-            <a:pPr marL="0" indent="0">
-              <a:buNone/>
-            </a:pPr>
-            <a:endParaRPr lang="en-US" sz="2000" dirty="0"/>
+            <a:endParaRPr lang="en-US" sz="2000" dirty="0">
+              <a:solidFill>
+                <a:schemeClr val="bg1">
+                  <a:lumMod val="75000"/>
+                </a:schemeClr>
+              </a:solidFill>
+            </a:endParaRPr>
           </a:p>
         </p:txBody>
       </p:sp>
@@ -5694,7 +6267,7 @@
 </p:sld>
 </file>
 
-<file path=ppt/slides/slide6.xml><?xml version="1.0" encoding="utf-8"?>
+<file path=ppt/slides/slide7.xml><?xml version="1.0" encoding="utf-8"?>
 <p:sld xmlns:a="http://schemas.openxmlformats.org/drawingml/2006/main" xmlns:r="http://schemas.openxmlformats.org/officeDocument/2006/relationships" xmlns:p="http://schemas.openxmlformats.org/presentationml/2006/main">
   <p:cSld>
     <p:spTree>
@@ -5740,7 +6313,13 @@
           <a:lstStyle/>
           <a:p>
             <a:r>
-              <a:rPr lang="en-US" sz="3600" dirty="0"/>
+              <a:rPr lang="en-US" sz="3600" dirty="0">
+                <a:solidFill>
+                  <a:schemeClr val="bg1">
+                    <a:lumMod val="65000"/>
+                  </a:schemeClr>
+                </a:solidFill>
+              </a:rPr>
               <a:t>Create A Safe Environment to Make Changes</a:t>
             </a:r>
           </a:p>
@@ -5778,7 +6357,13 @@
               <a:buNone/>
             </a:pPr>
             <a:r>
-              <a:rPr lang="en-US" sz="2000" dirty="0"/>
+              <a:rPr lang="en-US" sz="2000" dirty="0">
+                <a:solidFill>
+                  <a:schemeClr val="bg1">
+                    <a:lumMod val="65000"/>
+                  </a:schemeClr>
+                </a:solidFill>
+              </a:rPr>
               <a:t>Step 1 – Create initial Google Maps files: </a:t>
             </a:r>
           </a:p>
@@ -5788,23 +6373,53 @@
               <a:buAutoNum type="arabicPeriod"/>
             </a:pPr>
             <a:r>
-              <a:rPr lang="en-US" sz="2000" dirty="0"/>
+              <a:rPr lang="en-US" sz="2000" dirty="0">
+                <a:solidFill>
+                  <a:schemeClr val="bg1">
+                    <a:lumMod val="65000"/>
+                  </a:schemeClr>
+                </a:solidFill>
+              </a:rPr>
               <a:t>Copy all three ‘hello-world’ files and name them ‘google-maps-step-01’ html, </a:t>
             </a:r>
             <a:r>
-              <a:rPr lang="en-US" sz="2000" dirty="0" err="1"/>
+              <a:rPr lang="en-US" sz="2000" dirty="0" err="1">
+                <a:solidFill>
+                  <a:schemeClr val="bg1">
+                    <a:lumMod val="65000"/>
+                  </a:schemeClr>
+                </a:solidFill>
+              </a:rPr>
               <a:t>css</a:t>
             </a:r>
             <a:r>
-              <a:rPr lang="en-US" sz="2000" dirty="0"/>
+              <a:rPr lang="en-US" sz="2000" dirty="0">
+                <a:solidFill>
+                  <a:schemeClr val="bg1">
+                    <a:lumMod val="65000"/>
+                  </a:schemeClr>
+                </a:solidFill>
+              </a:rPr>
               <a:t>, and </a:t>
             </a:r>
             <a:r>
-              <a:rPr lang="en-US" sz="2000" dirty="0" err="1"/>
+              <a:rPr lang="en-US" sz="2000" dirty="0" err="1">
+                <a:solidFill>
+                  <a:schemeClr val="bg1">
+                    <a:lumMod val="65000"/>
+                  </a:schemeClr>
+                </a:solidFill>
+              </a:rPr>
               <a:t>js</a:t>
             </a:r>
             <a:r>
-              <a:rPr lang="en-US" sz="2000" dirty="0"/>
+              <a:rPr lang="en-US" sz="2000" dirty="0">
+                <a:solidFill>
+                  <a:schemeClr val="bg1">
+                    <a:lumMod val="65000"/>
+                  </a:schemeClr>
+                </a:solidFill>
+              </a:rPr>
               <a:t> files</a:t>
             </a:r>
           </a:p>
@@ -5814,7 +6429,13 @@
               <a:buAutoNum type="arabicPeriod"/>
             </a:pPr>
             <a:r>
-              <a:rPr lang="en-US" sz="2000" dirty="0"/>
+              <a:rPr lang="en-US" sz="2000" dirty="0">
+                <a:solidFill>
+                  <a:schemeClr val="bg1">
+                    <a:lumMod val="65000"/>
+                  </a:schemeClr>
+                </a:solidFill>
+              </a:rPr>
               <a:t>Update links in ‘google-maps-step-01.html’ to reflect new names</a:t>
             </a:r>
           </a:p>
@@ -5824,7 +6445,13 @@
               <a:buAutoNum type="arabicPeriod"/>
             </a:pPr>
             <a:r>
-              <a:rPr lang="en-US" sz="2000" dirty="0"/>
+              <a:rPr lang="en-US" sz="2000" dirty="0">
+                <a:solidFill>
+                  <a:schemeClr val="bg1">
+                    <a:lumMod val="65000"/>
+                  </a:schemeClr>
+                </a:solidFill>
+              </a:rPr>
               <a:t>Update title to ‘Google Maps’</a:t>
             </a:r>
           </a:p>
@@ -5834,7 +6461,13 @@
               <a:buAutoNum type="arabicPeriod"/>
             </a:pPr>
             <a:r>
-              <a:rPr lang="en-US" sz="2000" dirty="0"/>
+              <a:rPr lang="en-US" sz="2000" dirty="0">
+                <a:solidFill>
+                  <a:schemeClr val="bg1">
+                    <a:lumMod val="65000"/>
+                  </a:schemeClr>
+                </a:solidFill>
+              </a:rPr>
               <a:t>Update ‘console.log()’ message to reflect ‘Step 1’ and test new files</a:t>
             </a:r>
           </a:p>
@@ -5844,7 +6477,13 @@
               <a:buAutoNum type="arabicPeriod"/>
             </a:pPr>
             <a:r>
-              <a:rPr lang="en-US" sz="2000" dirty="0"/>
+              <a:rPr lang="en-US" sz="2000" dirty="0">
+                <a:solidFill>
+                  <a:schemeClr val="bg1">
+                    <a:lumMod val="65000"/>
+                  </a:schemeClr>
+                </a:solidFill>
+              </a:rPr>
               <a:t>Test utilizing Google Developer Tools… does it work? </a:t>
             </a:r>
           </a:p>
@@ -5854,49 +6493,15 @@
               <a:buAutoNum type="arabicPeriod"/>
             </a:pPr>
             <a:r>
-              <a:rPr lang="en-US" sz="2000" dirty="0"/>
+              <a:rPr lang="en-US" sz="2000" dirty="0">
+                <a:solidFill>
+                  <a:schemeClr val="bg1">
+                    <a:lumMod val="65000"/>
+                  </a:schemeClr>
+                </a:solidFill>
+              </a:rPr>
               <a:t>Success!</a:t>
             </a:r>
-          </a:p>
-          <a:p>
-            <a:pPr marL="457200" indent="-457200">
-              <a:buFont typeface="+mj-lt"/>
-              <a:buAutoNum type="arabicPeriod"/>
-            </a:pPr>
-            <a:endParaRPr lang="en-US" sz="2000" dirty="0"/>
-          </a:p>
-          <a:p>
-            <a:endParaRPr lang="en-US" sz="2000" dirty="0"/>
-          </a:p>
-          <a:p>
-            <a:pPr marL="0" indent="0">
-              <a:buNone/>
-            </a:pPr>
-            <a:endParaRPr lang="en-US" sz="2000" dirty="0"/>
-          </a:p>
-          <a:p>
-            <a:pPr marL="0" indent="0">
-              <a:buNone/>
-            </a:pPr>
-            <a:endParaRPr lang="en-US" sz="2000" dirty="0"/>
-          </a:p>
-          <a:p>
-            <a:pPr marL="0" indent="0">
-              <a:buNone/>
-            </a:pPr>
-            <a:endParaRPr lang="en-US" sz="2000" dirty="0"/>
-          </a:p>
-          <a:p>
-            <a:pPr marL="0" indent="0">
-              <a:buNone/>
-            </a:pPr>
-            <a:endParaRPr lang="en-US" sz="2000" dirty="0"/>
-          </a:p>
-          <a:p>
-            <a:pPr marL="0" indent="0">
-              <a:buNone/>
-            </a:pPr>
-            <a:endParaRPr lang="en-US" sz="2000" dirty="0"/>
           </a:p>
         </p:txBody>
       </p:sp>
@@ -6007,7 +6612,7 @@
 </p:sld>
 </file>
 
-<file path=ppt/slides/slide7.xml><?xml version="1.0" encoding="utf-8"?>
+<file path=ppt/slides/slide8.xml><?xml version="1.0" encoding="utf-8"?>
 <p:sld xmlns:a="http://schemas.openxmlformats.org/drawingml/2006/main" xmlns:r="http://schemas.openxmlformats.org/officeDocument/2006/relationships" xmlns:p="http://schemas.openxmlformats.org/presentationml/2006/main">
   <p:cSld>
     <p:spTree>
@@ -6053,7 +6658,13 @@
           <a:lstStyle/>
           <a:p>
             <a:r>
-              <a:rPr lang="en-US" sz="3600" dirty="0"/>
+              <a:rPr lang="en-US" sz="3600" dirty="0">
+                <a:solidFill>
+                  <a:schemeClr val="bg1">
+                    <a:lumMod val="65000"/>
+                  </a:schemeClr>
+                </a:solidFill>
+              </a:rPr>
               <a:t>Add Tutorial Code for a Map and Markers</a:t>
             </a:r>
           </a:p>
@@ -6091,7 +6702,13 @@
               <a:buNone/>
             </a:pPr>
             <a:r>
-              <a:rPr lang="en-US" sz="2000" dirty="0"/>
+              <a:rPr lang="en-US" sz="2000" dirty="0">
+                <a:solidFill>
+                  <a:schemeClr val="bg1">
+                    <a:lumMod val="65000"/>
+                  </a:schemeClr>
+                </a:solidFill>
+              </a:rPr>
               <a:t>Step 2 – Add a Google Map and two Markers: </a:t>
             </a:r>
           </a:p>
@@ -6101,23 +6718,53 @@
               <a:buAutoNum type="arabicPeriod"/>
             </a:pPr>
             <a:r>
-              <a:rPr lang="en-US" sz="2000" dirty="0"/>
+              <a:rPr lang="en-US" sz="2000" dirty="0">
+                <a:solidFill>
+                  <a:schemeClr val="bg1">
+                    <a:lumMod val="65000"/>
+                  </a:schemeClr>
+                </a:solidFill>
+              </a:rPr>
               <a:t>Copy all three ‘step-01’ files to ‘step-02’ html, </a:t>
             </a:r>
             <a:r>
-              <a:rPr lang="en-US" sz="2000" dirty="0" err="1"/>
+              <a:rPr lang="en-US" sz="2000" dirty="0" err="1">
+                <a:solidFill>
+                  <a:schemeClr val="bg1">
+                    <a:lumMod val="65000"/>
+                  </a:schemeClr>
+                </a:solidFill>
+              </a:rPr>
               <a:t>css</a:t>
             </a:r>
             <a:r>
-              <a:rPr lang="en-US" sz="2000" dirty="0"/>
+              <a:rPr lang="en-US" sz="2000" dirty="0">
+                <a:solidFill>
+                  <a:schemeClr val="bg1">
+                    <a:lumMod val="65000"/>
+                  </a:schemeClr>
+                </a:solidFill>
+              </a:rPr>
               <a:t>, and </a:t>
             </a:r>
             <a:r>
-              <a:rPr lang="en-US" sz="2000" dirty="0" err="1"/>
+              <a:rPr lang="en-US" sz="2000" dirty="0" err="1">
+                <a:solidFill>
+                  <a:schemeClr val="bg1">
+                    <a:lumMod val="65000"/>
+                  </a:schemeClr>
+                </a:solidFill>
+              </a:rPr>
               <a:t>js</a:t>
             </a:r>
             <a:r>
-              <a:rPr lang="en-US" sz="2000" dirty="0"/>
+              <a:rPr lang="en-US" sz="2000" dirty="0">
+                <a:solidFill>
+                  <a:schemeClr val="bg1">
+                    <a:lumMod val="65000"/>
+                  </a:schemeClr>
+                </a:solidFill>
+              </a:rPr>
               <a:t> files</a:t>
             </a:r>
           </a:p>
@@ -6127,7 +6774,13 @@
               <a:buAutoNum type="arabicPeriod"/>
             </a:pPr>
             <a:r>
-              <a:rPr lang="en-US" sz="2000" dirty="0"/>
+              <a:rPr lang="en-US" sz="2000" dirty="0">
+                <a:solidFill>
+                  <a:schemeClr val="bg1">
+                    <a:lumMod val="65000"/>
+                  </a:schemeClr>
+                </a:solidFill>
+              </a:rPr>
               <a:t>Update links in ‘google-maps-step-02.html’ to reflect new names</a:t>
             </a:r>
           </a:p>
@@ -6137,7 +6790,13 @@
               <a:buAutoNum type="arabicPeriod"/>
             </a:pPr>
             <a:r>
-              <a:rPr lang="en-US" sz="2000" dirty="0"/>
+              <a:rPr lang="en-US" sz="2000" dirty="0">
+                <a:solidFill>
+                  <a:schemeClr val="bg1">
+                    <a:lumMod val="65000"/>
+                  </a:schemeClr>
+                </a:solidFill>
+              </a:rPr>
               <a:t>Update ‘console.log()’ message to reflect ‘Step 2’ and test new files… does it work? </a:t>
             </a:r>
           </a:p>
@@ -6147,7 +6806,13 @@
               <a:buAutoNum type="arabicPeriod"/>
             </a:pPr>
             <a:r>
-              <a:rPr lang="en-US" sz="2000" dirty="0"/>
+              <a:rPr lang="en-US" sz="2000" dirty="0">
+                <a:solidFill>
+                  <a:schemeClr val="bg1">
+                    <a:lumMod val="65000"/>
+                  </a:schemeClr>
+                </a:solidFill>
+              </a:rPr>
               <a:t>Now add code from Google Maps tutorial to Step 2 files</a:t>
             </a:r>
           </a:p>
@@ -6157,7 +6822,13 @@
               <a:buAutoNum type="arabicPeriod"/>
             </a:pPr>
             <a:r>
-              <a:rPr lang="en-US" sz="2000" dirty="0"/>
+              <a:rPr lang="en-US" sz="2000" dirty="0">
+                <a:solidFill>
+                  <a:schemeClr val="bg1">
+                    <a:lumMod val="65000"/>
+                  </a:schemeClr>
+                </a:solidFill>
+              </a:rPr>
               <a:t>Test it!... does it work? </a:t>
             </a:r>
           </a:p>
@@ -6167,7 +6838,13 @@
               <a:buAutoNum type="arabicPeriod"/>
             </a:pPr>
             <a:r>
-              <a:rPr lang="en-US" sz="2000" dirty="0"/>
+              <a:rPr lang="en-US" sz="2000" dirty="0">
+                <a:solidFill>
+                  <a:schemeClr val="bg1">
+                    <a:lumMod val="65000"/>
+                  </a:schemeClr>
+                </a:solidFill>
+              </a:rPr>
               <a:t>Add a marker like they did in the second tutorial… does it work? </a:t>
             </a:r>
           </a:p>
@@ -6177,7 +6854,13 @@
               <a:buAutoNum type="arabicPeriod"/>
             </a:pPr>
             <a:r>
-              <a:rPr lang="en-US" sz="2000" dirty="0"/>
+              <a:rPr lang="en-US" sz="2000" dirty="0">
+                <a:solidFill>
+                  <a:schemeClr val="bg1">
+                    <a:lumMod val="65000"/>
+                  </a:schemeClr>
+                </a:solidFill>
+              </a:rPr>
               <a:t>Add a second marker with a custom icon and Listener… does it work? </a:t>
             </a:r>
           </a:p>
@@ -6187,7 +6870,13 @@
               <a:buAutoNum type="arabicPeriod"/>
             </a:pPr>
             <a:r>
-              <a:rPr lang="en-US" sz="2000" dirty="0"/>
+              <a:rPr lang="en-US" sz="2000" dirty="0">
+                <a:solidFill>
+                  <a:schemeClr val="bg1">
+                    <a:lumMod val="65000"/>
+                  </a:schemeClr>
+                </a:solidFill>
+              </a:rPr>
               <a:t>Success!</a:t>
             </a:r>
           </a:p>
@@ -6196,7 +6885,13 @@
               <a:buFont typeface="+mj-lt"/>
               <a:buAutoNum type="arabicPeriod"/>
             </a:pPr>
-            <a:endParaRPr lang="en-US" sz="2000" dirty="0"/>
+            <a:endParaRPr lang="en-US" sz="2000" dirty="0">
+              <a:solidFill>
+                <a:schemeClr val="bg1">
+                  <a:lumMod val="65000"/>
+                </a:schemeClr>
+              </a:solidFill>
+            </a:endParaRPr>
           </a:p>
           <a:p>
             <a:pPr marL="457200" indent="-457200">
@@ -6204,62 +6899,15 @@
               <a:buAutoNum type="arabicPeriod"/>
             </a:pPr>
             <a:r>
-              <a:rPr lang="en-US" sz="2000" dirty="0"/>
+              <a:rPr lang="en-US" sz="2000" dirty="0">
+                <a:solidFill>
+                  <a:schemeClr val="bg1">
+                    <a:lumMod val="65000"/>
+                  </a:schemeClr>
+                </a:solidFill>
+              </a:rPr>
               <a:t>Time check…</a:t>
             </a:r>
-          </a:p>
-          <a:p>
-            <a:pPr marL="0" indent="0">
-              <a:buNone/>
-            </a:pPr>
-            <a:endParaRPr lang="en-US" sz="2000" dirty="0"/>
-          </a:p>
-          <a:p>
-            <a:pPr marL="457200" indent="-457200">
-              <a:buFont typeface="+mj-lt"/>
-              <a:buAutoNum type="arabicPeriod"/>
-            </a:pPr>
-            <a:endParaRPr lang="en-US" sz="2000" dirty="0"/>
-          </a:p>
-          <a:p>
-            <a:pPr marL="457200" indent="-457200">
-              <a:buFont typeface="+mj-lt"/>
-              <a:buAutoNum type="arabicPeriod"/>
-            </a:pPr>
-            <a:endParaRPr lang="en-US" sz="2000" dirty="0"/>
-          </a:p>
-          <a:p>
-            <a:endParaRPr lang="en-US" sz="2000" dirty="0"/>
-          </a:p>
-          <a:p>
-            <a:pPr marL="0" indent="0">
-              <a:buNone/>
-            </a:pPr>
-            <a:endParaRPr lang="en-US" sz="2000" dirty="0"/>
-          </a:p>
-          <a:p>
-            <a:pPr marL="0" indent="0">
-              <a:buNone/>
-            </a:pPr>
-            <a:endParaRPr lang="en-US" sz="2000" dirty="0"/>
-          </a:p>
-          <a:p>
-            <a:pPr marL="0" indent="0">
-              <a:buNone/>
-            </a:pPr>
-            <a:endParaRPr lang="en-US" sz="2000" dirty="0"/>
-          </a:p>
-          <a:p>
-            <a:pPr marL="0" indent="0">
-              <a:buNone/>
-            </a:pPr>
-            <a:endParaRPr lang="en-US" sz="2000" dirty="0"/>
-          </a:p>
-          <a:p>
-            <a:pPr marL="0" indent="0">
-              <a:buNone/>
-            </a:pPr>
-            <a:endParaRPr lang="en-US" sz="2000" dirty="0"/>
           </a:p>
         </p:txBody>
       </p:sp>
@@ -6370,7 +7018,7 @@
 </p:sld>
 </file>
 
-<file path=ppt/slides/slide8.xml><?xml version="1.0" encoding="utf-8"?>
+<file path=ppt/slides/slide9.xml><?xml version="1.0" encoding="utf-8"?>
 <p:sld xmlns:a="http://schemas.openxmlformats.org/drawingml/2006/main" xmlns:r="http://schemas.openxmlformats.org/officeDocument/2006/relationships" xmlns:p="http://schemas.openxmlformats.org/presentationml/2006/main">
   <p:cSld>
     <p:spTree>
@@ -6510,6 +7158,42 @@
             <a:r>
               <a:rPr lang="en-US" sz="2000" dirty="0"/>
               <a:t>Update ‘console.log()’ message to reflect ‘Step 3’ and test new files… does it work? </a:t>
+            </a:r>
+          </a:p>
+          <a:p>
+            <a:pPr marL="457200" indent="-457200">
+              <a:buFont typeface="+mj-lt"/>
+              <a:buAutoNum type="arabicPeriod"/>
+            </a:pPr>
+            <a:r>
+              <a:rPr lang="en-US" sz="2000" dirty="0"/>
+              <a:t>Create a new function called “</a:t>
+            </a:r>
+            <a:r>
+              <a:rPr lang="en-US" sz="2000" dirty="0" err="1"/>
+              <a:t>UpdateGame</a:t>
+            </a:r>
+            <a:r>
+              <a:rPr lang="en-US" sz="2000" dirty="0"/>
+              <a:t>”</a:t>
+            </a:r>
+          </a:p>
+          <a:p>
+            <a:pPr marL="457200" indent="-457200">
+              <a:buFont typeface="+mj-lt"/>
+              <a:buAutoNum type="arabicPeriod"/>
+            </a:pPr>
+            <a:r>
+              <a:rPr lang="en-US" sz="2000" dirty="0"/>
+              <a:t>Call </a:t>
+            </a:r>
+            <a:r>
+              <a:rPr lang="en-US" sz="2000" dirty="0" err="1"/>
+              <a:t>UpdateGame</a:t>
+            </a:r>
+            <a:r>
+              <a:rPr lang="en-US" sz="2000" dirty="0"/>
+              <a:t> from the idle listener</a:t>
             </a:r>
           </a:p>
           <a:p>
@@ -6679,305 +7363,6 @@
     <p:extLst>
       <p:ext uri="{BB962C8B-B14F-4D97-AF65-F5344CB8AC3E}">
         <p14:creationId xmlns:p14="http://schemas.microsoft.com/office/powerpoint/2010/main" val="1018001874"/>
-      </p:ext>
-    </p:extLst>
-  </p:cSld>
-  <p:clrMapOvr>
-    <a:masterClrMapping/>
-  </p:clrMapOvr>
-</p:sld>
-</file>
-
-<file path=ppt/slides/slide9.xml><?xml version="1.0" encoding="utf-8"?>
-<p:sld xmlns:a="http://schemas.openxmlformats.org/drawingml/2006/main" xmlns:r="http://schemas.openxmlformats.org/officeDocument/2006/relationships" xmlns:p="http://schemas.openxmlformats.org/presentationml/2006/main">
-  <p:cSld>
-    <p:spTree>
-      <p:nvGrpSpPr>
-        <p:cNvPr id="1" name=""/>
-        <p:cNvGrpSpPr/>
-        <p:nvPr/>
-      </p:nvGrpSpPr>
-      <p:grpSpPr>
-        <a:xfrm>
-          <a:off x="0" y="0"/>
-          <a:ext cx="0" cy="0"/>
-          <a:chOff x="0" y="0"/>
-          <a:chExt cx="0" cy="0"/>
-        </a:xfrm>
-      </p:grpSpPr>
-      <p:sp>
-        <p:nvSpPr>
-          <p:cNvPr id="4" name="Title 1">
-            <a:extLst>
-              <a:ext uri="{FF2B5EF4-FFF2-40B4-BE49-F238E27FC236}">
-                <a16:creationId xmlns:a16="http://schemas.microsoft.com/office/drawing/2014/main" id="{527CE47F-3EF6-48CA-9239-E8B6E5C6B41A}"/>
-              </a:ext>
-            </a:extLst>
-          </p:cNvPr>
-          <p:cNvSpPr>
-            <a:spLocks noGrp="1"/>
-          </p:cNvSpPr>
-          <p:nvPr>
-            <p:ph type="title"/>
-          </p:nvPr>
-        </p:nvSpPr>
-        <p:spPr>
-          <a:xfrm>
-            <a:off x="838200" y="365125"/>
-            <a:ext cx="10515600" cy="1325563"/>
-          </a:xfrm>
-        </p:spPr>
-        <p:txBody>
-          <a:bodyPr>
-            <a:normAutofit/>
-          </a:bodyPr>
-          <a:lstStyle/>
-          <a:p>
-            <a:r>
-              <a:rPr lang="en-US" sz="3600" dirty="0"/>
-              <a:t>Remove or Repurpose Yahtzee Code</a:t>
-            </a:r>
-          </a:p>
-        </p:txBody>
-      </p:sp>
-      <p:sp>
-        <p:nvSpPr>
-          <p:cNvPr id="5" name="Content Placeholder 2">
-            <a:extLst>
-              <a:ext uri="{FF2B5EF4-FFF2-40B4-BE49-F238E27FC236}">
-                <a16:creationId xmlns:a16="http://schemas.microsoft.com/office/drawing/2014/main" id="{E8F0EA9A-219C-40FD-AE36-784EE1B77D56}"/>
-              </a:ext>
-            </a:extLst>
-          </p:cNvPr>
-          <p:cNvSpPr>
-            <a:spLocks noGrp="1"/>
-          </p:cNvSpPr>
-          <p:nvPr>
-            <p:ph idx="1"/>
-          </p:nvPr>
-        </p:nvSpPr>
-        <p:spPr>
-          <a:xfrm>
-            <a:off x="838198" y="1525772"/>
-            <a:ext cx="10515601" cy="4651191"/>
-          </a:xfrm>
-        </p:spPr>
-        <p:txBody>
-          <a:bodyPr>
-            <a:normAutofit/>
-          </a:bodyPr>
-          <a:lstStyle/>
-          <a:p>
-            <a:pPr marL="0" indent="0">
-              <a:buNone/>
-            </a:pPr>
-            <a:r>
-              <a:rPr lang="en-US" sz="2000" dirty="0"/>
-              <a:t>Step 4 – Create step 4 files and know what you will need to do to submit project: </a:t>
-            </a:r>
-          </a:p>
-          <a:p>
-            <a:pPr marL="457200" indent="-457200">
-              <a:buFont typeface="+mj-lt"/>
-              <a:buAutoNum type="arabicPeriod"/>
-            </a:pPr>
-            <a:r>
-              <a:rPr lang="en-US" sz="2000" dirty="0"/>
-              <a:t>Copy all three ‘step-03’ files to ‘step-04’ html, </a:t>
-            </a:r>
-            <a:r>
-              <a:rPr lang="en-US" sz="2000" dirty="0" err="1"/>
-              <a:t>css</a:t>
-            </a:r>
-            <a:r>
-              <a:rPr lang="en-US" sz="2000" dirty="0"/>
-              <a:t>, and </a:t>
-            </a:r>
-            <a:r>
-              <a:rPr lang="en-US" sz="2000" dirty="0" err="1"/>
-              <a:t>js</a:t>
-            </a:r>
-            <a:r>
-              <a:rPr lang="en-US" sz="2000" dirty="0"/>
-              <a:t> files</a:t>
-            </a:r>
-          </a:p>
-          <a:p>
-            <a:pPr marL="457200" indent="-457200">
-              <a:buFont typeface="+mj-lt"/>
-              <a:buAutoNum type="arabicPeriod"/>
-            </a:pPr>
-            <a:r>
-              <a:rPr lang="en-US" sz="2000" dirty="0"/>
-              <a:t>Remove/repurpose Yahtzee code to create Instructions and Hints… does it work? </a:t>
-            </a:r>
-          </a:p>
-          <a:p>
-            <a:pPr marL="457200" indent="-457200">
-              <a:buFont typeface="+mj-lt"/>
-              <a:buAutoNum type="arabicPeriod"/>
-            </a:pPr>
-            <a:r>
-              <a:rPr lang="en-US" sz="2000" dirty="0"/>
-              <a:t>If you want, you can utilize ‘step-04’ to continue enhancing your solution</a:t>
-            </a:r>
-          </a:p>
-          <a:p>
-            <a:pPr marL="457200" indent="-457200">
-              <a:buFont typeface="+mj-lt"/>
-              <a:buAutoNum type="arabicPeriod"/>
-            </a:pPr>
-            <a:r>
-              <a:rPr lang="en-US" sz="2000" dirty="0"/>
-              <a:t>Do you know what it would take to finalize and submit ‘step-04’? </a:t>
-            </a:r>
-          </a:p>
-          <a:p>
-            <a:pPr marL="0" indent="0">
-              <a:buNone/>
-            </a:pPr>
-            <a:endParaRPr lang="en-US" sz="2000" dirty="0"/>
-          </a:p>
-          <a:p>
-            <a:pPr marL="457200" indent="-457200">
-              <a:buFont typeface="+mj-lt"/>
-              <a:buAutoNum type="arabicPeriod"/>
-            </a:pPr>
-            <a:endParaRPr lang="en-US" sz="2000" dirty="0"/>
-          </a:p>
-          <a:p>
-            <a:endParaRPr lang="en-US" sz="2000" dirty="0"/>
-          </a:p>
-          <a:p>
-            <a:pPr marL="0" indent="0">
-              <a:buNone/>
-            </a:pPr>
-            <a:endParaRPr lang="en-US" sz="2000" dirty="0"/>
-          </a:p>
-          <a:p>
-            <a:pPr marL="0" indent="0">
-              <a:buNone/>
-            </a:pPr>
-            <a:endParaRPr lang="en-US" sz="2000" dirty="0"/>
-          </a:p>
-          <a:p>
-            <a:pPr marL="0" indent="0">
-              <a:buNone/>
-            </a:pPr>
-            <a:endParaRPr lang="en-US" sz="2000" dirty="0"/>
-          </a:p>
-          <a:p>
-            <a:pPr marL="0" indent="0">
-              <a:buNone/>
-            </a:pPr>
-            <a:endParaRPr lang="en-US" sz="2000" dirty="0"/>
-          </a:p>
-          <a:p>
-            <a:pPr marL="0" indent="0">
-              <a:buNone/>
-            </a:pPr>
-            <a:endParaRPr lang="en-US" sz="2000" dirty="0"/>
-          </a:p>
-        </p:txBody>
-      </p:sp>
-      <p:pic>
-        <p:nvPicPr>
-          <p:cNvPr id="2050" name="Picture 1" descr="Incorrect">
-            <a:extLst>
-              <a:ext uri="{FF2B5EF4-FFF2-40B4-BE49-F238E27FC236}">
-                <a16:creationId xmlns:a16="http://schemas.microsoft.com/office/drawing/2014/main" id="{FF58184F-9DBB-46F2-9AD1-5DD64E112630}"/>
-              </a:ext>
-            </a:extLst>
-          </p:cNvPr>
-          <p:cNvPicPr>
-            <a:picLocks noChangeAspect="1" noChangeArrowheads="1"/>
-          </p:cNvPicPr>
-          <p:nvPr/>
-        </p:nvPicPr>
-        <p:blipFill>
-          <a:blip r:embed="rId3">
-            <a:extLst>
-              <a:ext uri="{28A0092B-C50C-407E-A947-70E740481C1C}">
-                <a14:useLocalDpi xmlns:a14="http://schemas.microsoft.com/office/drawing/2010/main" val="0"/>
-              </a:ext>
-            </a:extLst>
-          </a:blip>
-          <a:srcRect/>
-          <a:stretch>
-            <a:fillRect/>
-          </a:stretch>
-        </p:blipFill>
-        <p:spPr bwMode="auto">
-          <a:xfrm>
-            <a:off x="0" y="0"/>
-            <a:ext cx="133350" cy="133350"/>
-          </a:xfrm>
-          <a:prstGeom prst="rect">
-            <a:avLst/>
-          </a:prstGeom>
-          <a:noFill/>
-          <a:extLst>
-            <a:ext uri="{909E8E84-426E-40DD-AFC4-6F175D3DCCD1}">
-              <a14:hiddenFill xmlns:a14="http://schemas.microsoft.com/office/drawing/2010/main">
-                <a:solidFill>
-                  <a:srgbClr val="FFFFFF"/>
-                </a:solidFill>
-              </a14:hiddenFill>
-            </a:ext>
-          </a:extLst>
-        </p:spPr>
-      </p:pic>
-      <p:pic>
-        <p:nvPicPr>
-          <p:cNvPr id="2051" name="Picture 2" descr="check">
-            <a:extLst>
-              <a:ext uri="{FF2B5EF4-FFF2-40B4-BE49-F238E27FC236}">
-                <a16:creationId xmlns:a16="http://schemas.microsoft.com/office/drawing/2014/main" id="{78300109-7A83-4484-8401-B9245A233358}"/>
-              </a:ext>
-            </a:extLst>
-          </p:cNvPr>
-          <p:cNvPicPr>
-            <a:picLocks noChangeAspect="1" noChangeArrowheads="1"/>
-          </p:cNvPicPr>
-          <p:nvPr/>
-        </p:nvPicPr>
-        <p:blipFill>
-          <a:blip r:embed="rId4">
-            <a:extLst>
-              <a:ext uri="{28A0092B-C50C-407E-A947-70E740481C1C}">
-                <a14:useLocalDpi xmlns:a14="http://schemas.microsoft.com/office/drawing/2010/main" val="0"/>
-              </a:ext>
-            </a:extLst>
-          </a:blip>
-          <a:srcRect/>
-          <a:stretch>
-            <a:fillRect/>
-          </a:stretch>
-        </p:blipFill>
-        <p:spPr bwMode="auto">
-          <a:xfrm>
-            <a:off x="0" y="0"/>
-            <a:ext cx="133350" cy="133350"/>
-          </a:xfrm>
-          <a:prstGeom prst="rect">
-            <a:avLst/>
-          </a:prstGeom>
-          <a:noFill/>
-          <a:extLst>
-            <a:ext uri="{909E8E84-426E-40DD-AFC4-6F175D3DCCD1}">
-              <a14:hiddenFill xmlns:a14="http://schemas.microsoft.com/office/drawing/2010/main">
-                <a:solidFill>
-                  <a:srgbClr val="FFFFFF"/>
-                </a:solidFill>
-              </a14:hiddenFill>
-            </a:ext>
-          </a:extLst>
-        </p:spPr>
-      </p:pic>
-    </p:spTree>
-    <p:extLst>
-      <p:ext uri="{BB962C8B-B14F-4D97-AF65-F5344CB8AC3E}">
-        <p14:creationId xmlns:p14="http://schemas.microsoft.com/office/powerpoint/2010/main" val="4292049979"/>
       </p:ext>
     </p:extLst>
   </p:cSld>

</xml_diff>